<commit_message>
criacao Diagrama Solucoes Software
</commit_message>
<xml_diff>
--- a/Documentação/Proto Persona/ProtoPersona.pptx
+++ b/Documentação/Proto Persona/ProtoPersona.pptx
@@ -116,19 +116,59 @@
 <pc:chgInfo xmlns:a="http://schemas.openxmlformats.org/drawingml/2006/main" xmlns:r="http://schemas.openxmlformats.org/officeDocument/2006/relationships" xmlns:ac="http://schemas.microsoft.com/office/drawing/2013/main/command" xmlns:pc="http://schemas.microsoft.com/office/powerpoint/2013/main/command">
   <pc:docChgLst>
     <pc:chgData name="Vinicius Cano" userId="e988c080-1d50-4980-86fe-45a1167ad471" providerId="ADAL" clId="{36C30181-06D3-4A78-8434-121D3256FF14}"/>
-    <pc:docChg chg="delSld modSld">
-      <pc:chgData name="Vinicius Cano" userId="e988c080-1d50-4980-86fe-45a1167ad471" providerId="ADAL" clId="{36C30181-06D3-4A78-8434-121D3256FF14}" dt="2021-08-24T21:16:58.358" v="3" actId="14100"/>
+    <pc:docChg chg="undo custSel delSld modSld">
+      <pc:chgData name="Vinicius Cano" userId="e988c080-1d50-4980-86fe-45a1167ad471" providerId="ADAL" clId="{36C30181-06D3-4A78-8434-121D3256FF14}" dt="2021-09-08T21:23:25.065" v="203" actId="14100"/>
       <pc:docMkLst>
         <pc:docMk/>
       </pc:docMkLst>
       <pc:sldChg chg="modSp mod">
-        <pc:chgData name="Vinicius Cano" userId="e988c080-1d50-4980-86fe-45a1167ad471" providerId="ADAL" clId="{36C30181-06D3-4A78-8434-121D3256FF14}" dt="2021-08-24T21:16:58.358" v="3" actId="14100"/>
+        <pc:chgData name="Vinicius Cano" userId="e988c080-1d50-4980-86fe-45a1167ad471" providerId="ADAL" clId="{36C30181-06D3-4A78-8434-121D3256FF14}" dt="2021-09-08T21:23:25.065" v="203" actId="14100"/>
         <pc:sldMkLst>
           <pc:docMk/>
           <pc:sldMk cId="1677204167" sldId="636"/>
         </pc:sldMkLst>
         <pc:spChg chg="mod">
-          <ac:chgData name="Vinicius Cano" userId="e988c080-1d50-4980-86fe-45a1167ad471" providerId="ADAL" clId="{36C30181-06D3-4A78-8434-121D3256FF14}" dt="2021-08-24T21:12:18.935" v="0"/>
+          <ac:chgData name="Vinicius Cano" userId="e988c080-1d50-4980-86fe-45a1167ad471" providerId="ADAL" clId="{36C30181-06D3-4A78-8434-121D3256FF14}" dt="2021-09-08T21:21:49.672" v="141" actId="14100"/>
+          <ac:spMkLst>
+            <pc:docMk/>
+            <pc:sldMk cId="1677204167" sldId="636"/>
+            <ac:spMk id="6" creationId="{00000000-0000-0000-0000-000000000000}"/>
+          </ac:spMkLst>
+        </pc:spChg>
+        <pc:spChg chg="mod">
+          <ac:chgData name="Vinicius Cano" userId="e988c080-1d50-4980-86fe-45a1167ad471" providerId="ADAL" clId="{36C30181-06D3-4A78-8434-121D3256FF14}" dt="2021-09-08T21:22:26.851" v="149" actId="14100"/>
+          <ac:spMkLst>
+            <pc:docMk/>
+            <pc:sldMk cId="1677204167" sldId="636"/>
+            <ac:spMk id="7" creationId="{00000000-0000-0000-0000-000000000000}"/>
+          </ac:spMkLst>
+        </pc:spChg>
+        <pc:spChg chg="mod">
+          <ac:chgData name="Vinicius Cano" userId="e988c080-1d50-4980-86fe-45a1167ad471" providerId="ADAL" clId="{36C30181-06D3-4A78-8434-121D3256FF14}" dt="2021-09-08T21:22:24.241" v="148" actId="1076"/>
+          <ac:spMkLst>
+            <pc:docMk/>
+            <pc:sldMk cId="1677204167" sldId="636"/>
+            <ac:spMk id="9" creationId="{00000000-0000-0000-0000-000000000000}"/>
+          </ac:spMkLst>
+        </pc:spChg>
+        <pc:spChg chg="mod">
+          <ac:chgData name="Vinicius Cano" userId="e988c080-1d50-4980-86fe-45a1167ad471" providerId="ADAL" clId="{36C30181-06D3-4A78-8434-121D3256FF14}" dt="2021-09-08T21:22:15.276" v="147" actId="1076"/>
+          <ac:spMkLst>
+            <pc:docMk/>
+            <pc:sldMk cId="1677204167" sldId="636"/>
+            <ac:spMk id="10" creationId="{00000000-0000-0000-0000-000000000000}"/>
+          </ac:spMkLst>
+        </pc:spChg>
+        <pc:spChg chg="mod">
+          <ac:chgData name="Vinicius Cano" userId="e988c080-1d50-4980-86fe-45a1167ad471" providerId="ADAL" clId="{36C30181-06D3-4A78-8434-121D3256FF14}" dt="2021-09-08T21:22:03.423" v="144" actId="14100"/>
+          <ac:spMkLst>
+            <pc:docMk/>
+            <pc:sldMk cId="1677204167" sldId="636"/>
+            <ac:spMk id="12" creationId="{00000000-0000-0000-0000-000000000000}"/>
+          </ac:spMkLst>
+        </pc:spChg>
+        <pc:spChg chg="mod">
+          <ac:chgData name="Vinicius Cano" userId="e988c080-1d50-4980-86fe-45a1167ad471" providerId="ADAL" clId="{36C30181-06D3-4A78-8434-121D3256FF14}" dt="2021-09-08T21:23:05.961" v="202" actId="20577"/>
           <ac:spMkLst>
             <pc:docMk/>
             <pc:sldMk cId="1677204167" sldId="636"/>
@@ -136,11 +176,27 @@
           </ac:spMkLst>
         </pc:spChg>
         <pc:spChg chg="mod">
-          <ac:chgData name="Vinicius Cano" userId="e988c080-1d50-4980-86fe-45a1167ad471" providerId="ADAL" clId="{36C30181-06D3-4A78-8434-121D3256FF14}" dt="2021-08-24T21:16:58.358" v="3" actId="14100"/>
+          <ac:chgData name="Vinicius Cano" userId="e988c080-1d50-4980-86fe-45a1167ad471" providerId="ADAL" clId="{36C30181-06D3-4A78-8434-121D3256FF14}" dt="2021-09-08T21:23:25.065" v="203" actId="14100"/>
           <ac:spMkLst>
             <pc:docMk/>
             <pc:sldMk cId="1677204167" sldId="636"/>
             <ac:spMk id="14" creationId="{00000000-0000-0000-0000-000000000000}"/>
+          </ac:spMkLst>
+        </pc:spChg>
+        <pc:spChg chg="mod">
+          <ac:chgData name="Vinicius Cano" userId="e988c080-1d50-4980-86fe-45a1167ad471" providerId="ADAL" clId="{36C30181-06D3-4A78-8434-121D3256FF14}" dt="2021-09-08T21:22:08.657" v="145" actId="14100"/>
+          <ac:spMkLst>
+            <pc:docMk/>
+            <pc:sldMk cId="1677204167" sldId="636"/>
+            <ac:spMk id="17" creationId="{00000000-0000-0000-0000-000000000000}"/>
+          </ac:spMkLst>
+        </pc:spChg>
+        <pc:spChg chg="mod">
+          <ac:chgData name="Vinicius Cano" userId="e988c080-1d50-4980-86fe-45a1167ad471" providerId="ADAL" clId="{36C30181-06D3-4A78-8434-121D3256FF14}" dt="2021-09-08T21:22:24.241" v="148" actId="1076"/>
+          <ac:spMkLst>
+            <pc:docMk/>
+            <pc:sldMk cId="1677204167" sldId="636"/>
+            <ac:spMk id="18" creationId="{00000000-0000-0000-0000-000000000000}"/>
           </ac:spMkLst>
         </pc:spChg>
       </pc:sldChg>
@@ -303,7 +359,7 @@
           <a:p>
             <a:fld id="{9BB33DEB-8C19-47AD-9AA5-1A5D16ED049C}" type="datetimeFigureOut">
               <a:rPr lang="pt-BR" smtClean="0"/>
-              <a:t>24/08/2021</a:t>
+              <a:t>08/09/2021</a:t>
             </a:fld>
             <a:endParaRPr lang="pt-BR"/>
           </a:p>
@@ -501,7 +557,7 @@
           <a:p>
             <a:fld id="{9BB33DEB-8C19-47AD-9AA5-1A5D16ED049C}" type="datetimeFigureOut">
               <a:rPr lang="pt-BR" smtClean="0"/>
-              <a:t>24/08/2021</a:t>
+              <a:t>08/09/2021</a:t>
             </a:fld>
             <a:endParaRPr lang="pt-BR"/>
           </a:p>
@@ -709,7 +765,7 @@
           <a:p>
             <a:fld id="{9BB33DEB-8C19-47AD-9AA5-1A5D16ED049C}" type="datetimeFigureOut">
               <a:rPr lang="pt-BR" smtClean="0"/>
-              <a:t>24/08/2021</a:t>
+              <a:t>08/09/2021</a:t>
             </a:fld>
             <a:endParaRPr lang="pt-BR"/>
           </a:p>
@@ -1907,7 +1963,7 @@
           <a:p>
             <a:fld id="{9BB33DEB-8C19-47AD-9AA5-1A5D16ED049C}" type="datetimeFigureOut">
               <a:rPr lang="pt-BR" smtClean="0"/>
-              <a:t>24/08/2021</a:t>
+              <a:t>08/09/2021</a:t>
             </a:fld>
             <a:endParaRPr lang="pt-BR"/>
           </a:p>
@@ -2182,7 +2238,7 @@
           <a:p>
             <a:fld id="{9BB33DEB-8C19-47AD-9AA5-1A5D16ED049C}" type="datetimeFigureOut">
               <a:rPr lang="pt-BR" smtClean="0"/>
-              <a:t>24/08/2021</a:t>
+              <a:t>08/09/2021</a:t>
             </a:fld>
             <a:endParaRPr lang="pt-BR"/>
           </a:p>
@@ -2447,7 +2503,7 @@
           <a:p>
             <a:fld id="{9BB33DEB-8C19-47AD-9AA5-1A5D16ED049C}" type="datetimeFigureOut">
               <a:rPr lang="pt-BR" smtClean="0"/>
-              <a:t>24/08/2021</a:t>
+              <a:t>08/09/2021</a:t>
             </a:fld>
             <a:endParaRPr lang="pt-BR"/>
           </a:p>
@@ -2859,7 +2915,7 @@
           <a:p>
             <a:fld id="{9BB33DEB-8C19-47AD-9AA5-1A5D16ED049C}" type="datetimeFigureOut">
               <a:rPr lang="pt-BR" smtClean="0"/>
-              <a:t>24/08/2021</a:t>
+              <a:t>08/09/2021</a:t>
             </a:fld>
             <a:endParaRPr lang="pt-BR"/>
           </a:p>
@@ -3000,7 +3056,7 @@
           <a:p>
             <a:fld id="{9BB33DEB-8C19-47AD-9AA5-1A5D16ED049C}" type="datetimeFigureOut">
               <a:rPr lang="pt-BR" smtClean="0"/>
-              <a:t>24/08/2021</a:t>
+              <a:t>08/09/2021</a:t>
             </a:fld>
             <a:endParaRPr lang="pt-BR"/>
           </a:p>
@@ -3113,7 +3169,7 @@
           <a:p>
             <a:fld id="{9BB33DEB-8C19-47AD-9AA5-1A5D16ED049C}" type="datetimeFigureOut">
               <a:rPr lang="pt-BR" smtClean="0"/>
-              <a:t>24/08/2021</a:t>
+              <a:t>08/09/2021</a:t>
             </a:fld>
             <a:endParaRPr lang="pt-BR"/>
           </a:p>
@@ -3424,7 +3480,7 @@
           <a:p>
             <a:fld id="{9BB33DEB-8C19-47AD-9AA5-1A5D16ED049C}" type="datetimeFigureOut">
               <a:rPr lang="pt-BR" smtClean="0"/>
-              <a:t>24/08/2021</a:t>
+              <a:t>08/09/2021</a:t>
             </a:fld>
             <a:endParaRPr lang="pt-BR"/>
           </a:p>
@@ -3712,7 +3768,7 @@
           <a:p>
             <a:fld id="{9BB33DEB-8C19-47AD-9AA5-1A5D16ED049C}" type="datetimeFigureOut">
               <a:rPr lang="pt-BR" smtClean="0"/>
-              <a:t>24/08/2021</a:t>
+              <a:t>08/09/2021</a:t>
             </a:fld>
             <a:endParaRPr lang="pt-BR"/>
           </a:p>
@@ -3953,7 +4009,7 @@
           <a:p>
             <a:fld id="{9BB33DEB-8C19-47AD-9AA5-1A5D16ED049C}" type="datetimeFigureOut">
               <a:rPr lang="pt-BR" smtClean="0"/>
-              <a:t>24/08/2021</a:t>
+              <a:t>08/09/2021</a:t>
             </a:fld>
             <a:endParaRPr lang="pt-BR"/>
           </a:p>
@@ -4444,7 +4500,7 @@
         <p:spPr>
           <a:xfrm>
             <a:off x="843046" y="1273862"/>
-            <a:ext cx="5223996" cy="2611998"/>
+            <a:ext cx="4885785" cy="2611998"/>
           </a:xfrm>
           <a:prstGeom prst="rect">
             <a:avLst/>
@@ -4490,7 +4546,7 @@
         <p:spPr>
           <a:xfrm>
             <a:off x="843046" y="3951712"/>
-            <a:ext cx="10513300" cy="1865482"/>
+            <a:ext cx="9861645" cy="1865482"/>
           </a:xfrm>
           <a:prstGeom prst="rect">
             <a:avLst/>
@@ -4535,8 +4591,8 @@
         </p:nvSpPr>
         <p:spPr>
           <a:xfrm>
-            <a:off x="6132350" y="1274116"/>
-            <a:ext cx="5223996" cy="2611998"/>
+            <a:off x="5818906" y="1284859"/>
+            <a:ext cx="4885785" cy="2611998"/>
           </a:xfrm>
           <a:prstGeom prst="rect">
             <a:avLst/>
@@ -4612,7 +4668,7 @@
         <p:spPr>
           <a:xfrm>
             <a:off x="2551975" y="2057945"/>
-            <a:ext cx="3626681" cy="873829"/>
+            <a:ext cx="3102591" cy="1124988"/>
           </a:xfrm>
           <a:prstGeom prst="rect">
             <a:avLst/>
@@ -4628,7 +4684,7 @@
               <a:rPr lang="pt-BR" sz="1814" dirty="0">
                 <a:latin typeface="Exo 2" panose="00000500000000000000" pitchFamily="50" charset="0"/>
               </a:rPr>
-              <a:t>Frederico</a:t>
+              <a:t>Frederico, 30 anos</a:t>
             </a:r>
           </a:p>
           <a:p>
@@ -4636,7 +4692,7 @@
               <a:rPr lang="pt-BR" sz="1632" dirty="0">
                 <a:latin typeface="Exo 2" panose="00000500000000000000" pitchFamily="50" charset="0"/>
               </a:rPr>
-              <a:t>“Sou dono de uma oficina mecânica e quero aumentar a minha clientela.”</a:t>
+              <a:t>“Sou dono de uma oficina mecânica e quero gerir melhor o caixa da minha oficina.”</a:t>
             </a:r>
           </a:p>
         </p:txBody>
@@ -4649,8 +4705,8 @@
         </p:nvSpPr>
         <p:spPr>
           <a:xfrm>
-            <a:off x="6132349" y="1817512"/>
-            <a:ext cx="5104991" cy="1621213"/>
+            <a:off x="5773571" y="1837754"/>
+            <a:ext cx="4885785" cy="1621213"/>
           </a:xfrm>
           <a:prstGeom prst="rect">
             <a:avLst/>
@@ -4885,45 +4941,13 @@
                 <a:latin typeface="Calibri"/>
                 <a:cs typeface="Calibri"/>
               </a:rPr>
-              <a:t>muitas</a:t>
-            </a:r>
-            <a:r>
-              <a:rPr lang="pt-BR" sz="1600" spc="-20" dirty="0">
-                <a:latin typeface="Calibri"/>
-                <a:cs typeface="Calibri"/>
-              </a:rPr>
-              <a:t> </a:t>
-            </a:r>
-            <a:r>
-              <a:rPr lang="pt-BR" sz="1600" spc="-10" dirty="0">
-                <a:latin typeface="Calibri"/>
-                <a:cs typeface="Calibri"/>
-              </a:rPr>
-              <a:t>redes</a:t>
-            </a:r>
-            <a:r>
-              <a:rPr lang="pt-BR" sz="1600" spc="-20" dirty="0">
-                <a:latin typeface="Calibri"/>
-                <a:cs typeface="Calibri"/>
-              </a:rPr>
-              <a:t> </a:t>
-            </a:r>
-            <a:r>
-              <a:rPr lang="pt-BR" sz="1600" spc="-10" dirty="0">
-                <a:latin typeface="Calibri"/>
-                <a:cs typeface="Calibri"/>
-              </a:rPr>
-              <a:t>sociais</a:t>
-            </a:r>
-            <a:endParaRPr lang="pt-BR" sz="1600" dirty="0">
-              <a:latin typeface="Calibri"/>
-              <a:cs typeface="Calibri"/>
-            </a:endParaRPr>
+              <a:t>nenhuma tecnologia de gerenciamento</a:t>
+            </a:r>
           </a:p>
           <a:p>
             <a:pPr marL="325120" indent="-312420">
               <a:lnSpc>
-                <a:spcPts val="1970"/>
+                <a:spcPts val="1960"/>
               </a:lnSpc>
               <a:buFont typeface="Arial"/>
               <a:buChar char="•"/>
@@ -4933,25 +4957,11 @@
               </a:tabLst>
             </a:pPr>
             <a:r>
-              <a:rPr lang="pt-BR" sz="1600" spc="-5" dirty="0">
+              <a:rPr lang="pt-BR" sz="1600" spc="-15" dirty="0">
                 <a:latin typeface="Calibri"/>
                 <a:cs typeface="Calibri"/>
               </a:rPr>
-              <a:t>É</a:t>
-            </a:r>
-            <a:r>
-              <a:rPr lang="pt-BR" sz="1600" spc="-40" dirty="0">
-                <a:latin typeface="Calibri"/>
-                <a:cs typeface="Calibri"/>
-              </a:rPr>
-              <a:t> </a:t>
-            </a:r>
-            <a:r>
-              <a:rPr lang="pt-BR" sz="1600" spc="-10" dirty="0">
-                <a:latin typeface="Calibri"/>
-                <a:cs typeface="Calibri"/>
-              </a:rPr>
-              <a:t>impaciente</a:t>
+              <a:t>Não sente confiança em tecnologia</a:t>
             </a:r>
             <a:endParaRPr lang="pt-BR" sz="1600" dirty="0">
               <a:latin typeface="Calibri"/>
@@ -4969,7 +4979,7 @@
         <p:spPr>
           <a:xfrm>
             <a:off x="842466" y="1372651"/>
-            <a:ext cx="5318842" cy="315599"/>
+            <a:ext cx="4885785" cy="315599"/>
           </a:xfrm>
           <a:prstGeom prst="rect">
             <a:avLst/>
@@ -5001,7 +5011,7 @@
         </p:nvSpPr>
         <p:spPr>
           <a:xfrm>
-            <a:off x="6253019" y="1429358"/>
+            <a:off x="5939575" y="1440101"/>
             <a:ext cx="3716153" cy="315599"/>
           </a:xfrm>
           <a:prstGeom prst="rect">
@@ -5068,7 +5078,7 @@
         <p:spPr>
           <a:xfrm>
             <a:off x="835075" y="4274304"/>
-            <a:ext cx="10513300" cy="1364733"/>
+            <a:ext cx="9824281" cy="1364733"/>
           </a:xfrm>
           <a:prstGeom prst="rect">
             <a:avLst/>
@@ -5276,12 +5286,8 @@
                 <a:latin typeface="Calibri"/>
                 <a:cs typeface="Calibri"/>
               </a:rPr>
-              <a:t> cadastro de clientes, carros e estoque de peças.</a:t>
-            </a:r>
-            <a:endParaRPr lang="pt-BR" sz="1600" spc="5" dirty="0">
-              <a:latin typeface="Calibri"/>
-              <a:cs typeface="Calibri"/>
-            </a:endParaRPr>
+              <a:t> melhor suas contas.</a:t>
+            </a:r>
           </a:p>
           <a:p>
             <a:pPr marL="394335" indent="-313055">

</xml_diff>